<commit_message>
updates for FCSA presentation
</commit_message>
<xml_diff>
--- a/Capstone/Presentation/CapstoneProposal.pptx
+++ b/Capstone/Presentation/CapstoneProposal.pptx
@@ -209,7 +209,7 @@
           <a:p>
             <a:fld id="{E3E0BA67-A448-48BB-B2A0-49FE4C1E5D33}" type="datetimeFigureOut">
               <a:rPr lang="en-US" smtClean="0"/>
-              <a:t>7/24/2021</a:t>
+              <a:t>08/16/2021</a:t>
             </a:fld>
             <a:endParaRPr lang="en-US"/>
           </a:p>
@@ -534,13 +534,13 @@
           <a:p>
             <a:r>
               <a:rPr lang="en-US" dirty="0"/>
-              <a:t>    -Application Developer at FCSA for 2.5 years</a:t>
-            </a:r>
-          </a:p>
-          <a:p>
-            <a:r>
-              <a:rPr lang="en-US" dirty="0"/>
-              <a:t>    -Been working on my Masters in Computer Science from UNO since 2017, set to graduate this August</a:t>
+              <a:t>    -Application Developer here at FCSA for a little over 2.5 years</a:t>
+            </a:r>
+          </a:p>
+          <a:p>
+            <a:r>
+              <a:rPr lang="en-US" dirty="0"/>
+              <a:t>    -Been working on my Masters in Computer Science from UNO since 2017, and I completed it this last week</a:t>
             </a:r>
           </a:p>
           <a:p>
@@ -555,7 +555,7 @@
           <a:p>
             <a:r>
               <a:rPr lang="en-US" dirty="0"/>
-              <a:t>-You might remember some of the content here from my initial presentation</a:t>
+              <a:t>-You might remember some of the content here from my initial presentation last April</a:t>
             </a:r>
           </a:p>
           <a:p>
@@ -837,37 +837,7 @@
           <a:p>
             <a:r>
               <a:rPr lang="en-US" dirty="0"/>
-              <a:t>-I implemented all the user stories I had planned and for the most part my implementation matches the mockups I created.</a:t>
-            </a:r>
-          </a:p>
-          <a:p>
-            <a:endParaRPr lang="en-US" dirty="0"/>
-          </a:p>
-          <a:p>
-            <a:r>
-              <a:rPr lang="en-US" dirty="0"/>
-              <a:t>-I would like to thank all 3 of you for being a part of my graduate committee</a:t>
-            </a:r>
-          </a:p>
-          <a:p>
-            <a:r>
-              <a:rPr lang="en-US" dirty="0"/>
-              <a:t>-I really appreciate everyone's time and participation</a:t>
-            </a:r>
-          </a:p>
-          <a:p>
-            <a:endParaRPr lang="en-US" dirty="0"/>
-          </a:p>
-          <a:p>
-            <a:r>
-              <a:rPr lang="en-US" dirty="0"/>
-              <a:t>-I would also like to give special thanks to Dr Dorn who throughout this last year has been meeting with me a few times a month to help me develop the proposal for this project and answer all my questions</a:t>
-            </a:r>
-          </a:p>
-          <a:p>
-            <a:r>
-              <a:rPr lang="en-US" dirty="0"/>
-              <a:t>-He was a big help to me this last year</a:t>
+              <a:t>-I implemented all the user stories I had planned in addition to a few others and for the most part my implementation matches the mockups I created.</a:t>
             </a:r>
           </a:p>
           <a:p>
@@ -2307,10 +2277,109 @@
           <a:p>
             <a:r>
               <a:rPr lang="en-US" dirty="0"/>
+              <a:t>-Some questions that would be good to get answered with usability test include:</a:t>
+            </a:r>
+            <a:br>
+              <a:rPr lang="en-US" dirty="0"/>
+            </a:br>
+            <a:r>
+              <a:rPr lang="en-US" dirty="0"/>
+              <a:t>    -</a:t>
+            </a:r>
+            <a:r>
+              <a:rPr lang="en-US" sz="1800" dirty="0">
+                <a:effectLst/>
+                <a:latin typeface="Calibri" panose="020F0502020204030204" pitchFamily="34" charset="0"/>
+                <a:ea typeface="Calibri" panose="020F0502020204030204" pitchFamily="34" charset="0"/>
+                <a:cs typeface="Times New Roman" panose="02020603050405020304" pitchFamily="18" charset="0"/>
+              </a:rPr>
+              <a:t>Are students able to navigate the interface?</a:t>
+            </a:r>
+          </a:p>
+          <a:p>
+            <a:r>
+              <a:rPr lang="en-US" sz="1800" dirty="0">
+                <a:effectLst/>
+                <a:latin typeface="Calibri" panose="020F0502020204030204" pitchFamily="34" charset="0"/>
+                <a:cs typeface="Times New Roman" panose="02020603050405020304" pitchFamily="18" charset="0"/>
+              </a:rPr>
+              <a:t>    -</a:t>
+            </a:r>
+            <a:r>
+              <a:rPr lang="en-US" sz="1800" dirty="0">
+                <a:effectLst/>
+                <a:latin typeface="Calibri" panose="020F0502020204030204" pitchFamily="34" charset="0"/>
+                <a:ea typeface="Calibri" panose="020F0502020204030204" pitchFamily="34" charset="0"/>
+                <a:cs typeface="Times New Roman" panose="02020603050405020304" pitchFamily="18" charset="0"/>
+              </a:rPr>
+              <a:t>In what ways are students able to interact with the application in order to select different counties?</a:t>
+            </a:r>
+          </a:p>
+          <a:p>
+            <a:r>
+              <a:rPr lang="en-US" sz="1800" dirty="0">
+                <a:effectLst/>
+                <a:latin typeface="Calibri" panose="020F0502020204030204" pitchFamily="34" charset="0"/>
+                <a:cs typeface="Times New Roman" panose="02020603050405020304" pitchFamily="18" charset="0"/>
+              </a:rPr>
+              <a:t>    -</a:t>
+            </a:r>
+            <a:r>
+              <a:rPr lang="en-US" sz="1800" dirty="0">
+                <a:effectLst/>
+                <a:latin typeface="Calibri" panose="020F0502020204030204" pitchFamily="34" charset="0"/>
+                <a:ea typeface="Calibri" panose="020F0502020204030204" pitchFamily="34" charset="0"/>
+                <a:cs typeface="Times New Roman" panose="02020603050405020304" pitchFamily="18" charset="0"/>
+              </a:rPr>
+              <a:t>Do students pick up on the meaning of the Pearson correlation coefficient shown?</a:t>
+            </a:r>
+          </a:p>
+          <a:p>
+            <a:endParaRPr lang="en-US" dirty="0"/>
+          </a:p>
+          <a:p>
+            <a:r>
+              <a:rPr lang="en-US" dirty="0"/>
               <a:t>-An eye tracking study to see how people are reasoning about the data might be useful as well.</a:t>
             </a:r>
           </a:p>
           <a:p>
+            <a:r>
+              <a:rPr lang="en-US" dirty="0"/>
+              <a:t>-Some questions that would be good to get answered with an eye tracking study include:</a:t>
+            </a:r>
+          </a:p>
+          <a:p>
+            <a:r>
+              <a:rPr lang="en-US" dirty="0"/>
+              <a:t>    -</a:t>
+            </a:r>
+            <a:r>
+              <a:rPr lang="en-US" sz="1800" b="0" i="0" u="none" strike="noStrike" baseline="0" dirty="0">
+                <a:latin typeface="Times New Roman" panose="02020603050405020304" pitchFamily="18" charset="0"/>
+              </a:rPr>
+              <a:t>What are users looking at in the application?</a:t>
+            </a:r>
+          </a:p>
+          <a:p>
+            <a:r>
+              <a:rPr lang="en-US" sz="1800" b="0" i="0" u="none" strike="noStrike" baseline="0" dirty="0">
+                <a:latin typeface="Times New Roman" panose="02020603050405020304" pitchFamily="18" charset="0"/>
+              </a:rPr>
+              <a:t>    -</a:t>
+            </a:r>
+            <a:r>
+              <a:rPr lang="en-US" sz="1800" dirty="0">
+                <a:effectLst/>
+                <a:latin typeface="Calibri" panose="020F0502020204030204" pitchFamily="34" charset="0"/>
+                <a:ea typeface="Calibri" panose="020F0502020204030204" pitchFamily="34" charset="0"/>
+                <a:cs typeface="Times New Roman" panose="02020603050405020304" pitchFamily="18" charset="0"/>
+              </a:rPr>
+              <a:t>How do users visually parse the page?</a:t>
+            </a:r>
+            <a:br>
+              <a:rPr lang="en-US" dirty="0"/>
+            </a:br>
             <a:endParaRPr lang="en-US" dirty="0"/>
           </a:p>
           <a:p>
@@ -2634,7 +2703,7 @@
           <a:p>
             <a:fld id="{45824D65-BF5F-4DF8-9B0D-124440FA57C7}" type="datetimeFigureOut">
               <a:rPr lang="en-US" smtClean="0"/>
-              <a:t>7/24/2021</a:t>
+              <a:t>08/16/2021</a:t>
             </a:fld>
             <a:endParaRPr lang="en-US"/>
           </a:p>
@@ -2842,7 +2911,7 @@
           <a:p>
             <a:fld id="{45824D65-BF5F-4DF8-9B0D-124440FA57C7}" type="datetimeFigureOut">
               <a:rPr lang="en-US" smtClean="0"/>
-              <a:t>7/24/2021</a:t>
+              <a:t>08/16/2021</a:t>
             </a:fld>
             <a:endParaRPr lang="en-US"/>
           </a:p>
@@ -3098,7 +3167,7 @@
           <a:p>
             <a:fld id="{45824D65-BF5F-4DF8-9B0D-124440FA57C7}" type="datetimeFigureOut">
               <a:rPr lang="en-US" smtClean="0"/>
-              <a:t>7/24/2021</a:t>
+              <a:t>08/16/2021</a:t>
             </a:fld>
             <a:endParaRPr lang="en-US"/>
           </a:p>
@@ -3272,7 +3341,7 @@
           <a:p>
             <a:fld id="{45824D65-BF5F-4DF8-9B0D-124440FA57C7}" type="datetimeFigureOut">
               <a:rPr lang="en-US" smtClean="0"/>
-              <a:t>7/24/2021</a:t>
+              <a:t>08/16/2021</a:t>
             </a:fld>
             <a:endParaRPr lang="en-US"/>
           </a:p>
@@ -3615,7 +3684,7 @@
           <a:p>
             <a:fld id="{45824D65-BF5F-4DF8-9B0D-124440FA57C7}" type="datetimeFigureOut">
               <a:rPr lang="en-US" smtClean="0"/>
-              <a:t>7/24/2021</a:t>
+              <a:t>08/16/2021</a:t>
             </a:fld>
             <a:endParaRPr lang="en-US"/>
           </a:p>
@@ -3890,7 +3959,7 @@
           <a:p>
             <a:fld id="{45824D65-BF5F-4DF8-9B0D-124440FA57C7}" type="datetimeFigureOut">
               <a:rPr lang="en-US" smtClean="0"/>
-              <a:t>7/24/2021</a:t>
+              <a:t>08/16/2021</a:t>
             </a:fld>
             <a:endParaRPr lang="en-US"/>
           </a:p>
@@ -4269,7 +4338,7 @@
           <a:p>
             <a:fld id="{45824D65-BF5F-4DF8-9B0D-124440FA57C7}" type="datetimeFigureOut">
               <a:rPr lang="en-US" smtClean="0"/>
-              <a:t>7/24/2021</a:t>
+              <a:t>08/16/2021</a:t>
             </a:fld>
             <a:endParaRPr lang="en-US"/>
           </a:p>
@@ -4387,7 +4456,7 @@
           <a:p>
             <a:fld id="{45824D65-BF5F-4DF8-9B0D-124440FA57C7}" type="datetimeFigureOut">
               <a:rPr lang="en-US" smtClean="0"/>
-              <a:t>7/24/2021</a:t>
+              <a:t>08/16/2021</a:t>
             </a:fld>
             <a:endParaRPr lang="en-US"/>
           </a:p>
@@ -4558,7 +4627,7 @@
           <a:p>
             <a:fld id="{45824D65-BF5F-4DF8-9B0D-124440FA57C7}" type="datetimeFigureOut">
               <a:rPr lang="en-US" smtClean="0"/>
-              <a:t>7/24/2021</a:t>
+              <a:t>08/16/2021</a:t>
             </a:fld>
             <a:endParaRPr lang="en-US"/>
           </a:p>
@@ -4912,7 +4981,7 @@
           <a:p>
             <a:fld id="{45824D65-BF5F-4DF8-9B0D-124440FA57C7}" type="datetimeFigureOut">
               <a:rPr lang="en-US" smtClean="0"/>
-              <a:t>7/24/2021</a:t>
+              <a:t>08/16/2021</a:t>
             </a:fld>
             <a:endParaRPr lang="en-US"/>
           </a:p>
@@ -5294,7 +5363,7 @@
           <a:p>
             <a:fld id="{45824D65-BF5F-4DF8-9B0D-124440FA57C7}" type="datetimeFigureOut">
               <a:rPr lang="en-US" smtClean="0"/>
-              <a:t>7/24/2021</a:t>
+              <a:t>08/16/2021</a:t>
             </a:fld>
             <a:endParaRPr lang="en-US"/>
           </a:p>
@@ -5581,7 +5650,7 @@
           <a:p>
             <a:fld id="{45824D65-BF5F-4DF8-9B0D-124440FA57C7}" type="datetimeFigureOut">
               <a:rPr lang="en-US" smtClean="0"/>
-              <a:t>7/24/2021</a:t>
+              <a:t>08/16/2021</a:t>
             </a:fld>
             <a:endParaRPr lang="en-US"/>
           </a:p>
@@ -6162,13 +6231,8 @@
           <a:p>
             <a:r>
               <a:rPr lang="en-US" dirty="0"/>
-              <a:t>Master’s Capstone </a:t>
-            </a:r>
-            <a:r>
-              <a:rPr lang="en-US"/>
-              <a:t>Project Proposal</a:t>
-            </a:r>
-            <a:endParaRPr lang="en-US" dirty="0"/>
+              <a:t>Master’s Capstone Project</a:t>
+            </a:r>
           </a:p>
         </p:txBody>
       </p:sp>
@@ -6352,10 +6416,10 @@
       </p:sp>
       <p:pic>
         <p:nvPicPr>
-          <p:cNvPr id="5" name="Picture 4">
+          <p:cNvPr id="4" name="Picture 3">
             <a:extLst>
               <a:ext uri="{FF2B5EF4-FFF2-40B4-BE49-F238E27FC236}">
-                <a16:creationId xmlns:a16="http://schemas.microsoft.com/office/drawing/2014/main" id="{BB83C002-EE3A-4B9C-8C2B-9A85F35CA393}"/>
+                <a16:creationId xmlns:a16="http://schemas.microsoft.com/office/drawing/2014/main" id="{F04BABB3-98C2-4C58-B265-7F861DF5DD74}"/>
               </a:ext>
             </a:extLst>
           </p:cNvPr>
@@ -6372,8 +6436,8 @@
         </p:blipFill>
         <p:spPr>
           <a:xfrm>
-            <a:off x="2888368" y="1845735"/>
-            <a:ext cx="5657321" cy="4305278"/>
+            <a:off x="3394225" y="1951849"/>
+            <a:ext cx="5464510" cy="4244467"/>
           </a:xfrm>
           <a:prstGeom prst="rect">
             <a:avLst/>

</xml_diff>